<commit_message>
Update Sprint 1 pres
</commit_message>
<xml_diff>
--- a/Documentation/Sprint 1 Pres.pptx
+++ b/Documentation/Sprint 1 Pres.pptx
@@ -10,6 +10,9 @@
     <p:sldId id="258" r:id="rId4"/>
     <p:sldId id="259" r:id="rId5"/>
     <p:sldId id="260" r:id="rId6"/>
+    <p:sldId id="261" r:id="rId7"/>
+    <p:sldId id="262" r:id="rId8"/>
+    <p:sldId id="263" r:id="rId9"/>
   </p:sldIdLst>
   <p:sldSz cx="12192000" cy="6858000"/>
   <p:notesSz cx="6858000" cy="9144000"/>
@@ -108,6 +111,11 @@
       </a:defRPr>
     </a:lvl9pPr>
   </p:defaultTextStyle>
+  <p:extLst>
+    <p:ext uri="{EFAFB233-063F-42B5-8137-9DF3F51BA10A}">
+      <p15:sldGuideLst xmlns:p15="http://schemas.microsoft.com/office/powerpoint/2012/main"/>
+    </p:ext>
+  </p:extLst>
 </p:presentation>
 </file>
 
@@ -3752,7 +3760,10 @@
           <a:bodyPr/>
           <a:lstStyle/>
           <a:p>
-            <a:endParaRPr lang="en-US"/>
+            <a:r>
+              <a:rPr lang="en-US" dirty="0"/>
+              <a:t>Sub Systems Design</a:t>
+            </a:r>
           </a:p>
         </p:txBody>
       </p:sp>
@@ -3777,7 +3788,35 @@
           <a:bodyPr/>
           <a:lstStyle/>
           <a:p>
-            <a:endParaRPr lang="en-US"/>
+            <a:r>
+              <a:rPr lang="en-US" dirty="0"/>
+              <a:t>Automatic Speech Recognition(ASR)</a:t>
+            </a:r>
+          </a:p>
+          <a:p>
+            <a:pPr lvl="1"/>
+            <a:r>
+              <a:rPr lang="en-US" dirty="0"/>
+              <a:t>Nvidia Nemo Models</a:t>
+            </a:r>
+          </a:p>
+          <a:p>
+            <a:r>
+              <a:rPr lang="en-US" dirty="0"/>
+              <a:t>Website</a:t>
+            </a:r>
+          </a:p>
+          <a:p>
+            <a:pPr marL="457200" lvl="1" indent="0">
+              <a:buNone/>
+            </a:pPr>
+            <a:endParaRPr lang="en-US" dirty="0"/>
+          </a:p>
+          <a:p>
+            <a:pPr marL="0" indent="0">
+              <a:buNone/>
+            </a:pPr>
+            <a:endParaRPr lang="en-US" dirty="0"/>
           </a:p>
         </p:txBody>
       </p:sp>
@@ -3785,6 +3824,267 @@
     <p:extLst>
       <p:ext uri="{BB962C8B-B14F-4D97-AF65-F5344CB8AC3E}">
         <p14:creationId xmlns:p14="http://schemas.microsoft.com/office/powerpoint/2010/main" val="378849462"/>
+      </p:ext>
+    </p:extLst>
+  </p:cSld>
+  <p:clrMapOvr>
+    <a:masterClrMapping/>
+  </p:clrMapOvr>
+</p:sld>
+</file>
+
+<file path=ppt/slides/slide6.xml><?xml version="1.0" encoding="utf-8"?>
+<p:sld xmlns:a="http://schemas.openxmlformats.org/drawingml/2006/main" xmlns:r="http://schemas.openxmlformats.org/officeDocument/2006/relationships" xmlns:p="http://schemas.openxmlformats.org/presentationml/2006/main">
+  <p:cSld>
+    <p:spTree>
+      <p:nvGrpSpPr>
+        <p:cNvPr id="1" name=""/>
+        <p:cNvGrpSpPr/>
+        <p:nvPr/>
+      </p:nvGrpSpPr>
+      <p:grpSpPr>
+        <a:xfrm>
+          <a:off x="0" y="0"/>
+          <a:ext cx="0" cy="0"/>
+          <a:chOff x="0" y="0"/>
+          <a:chExt cx="0" cy="0"/>
+        </a:xfrm>
+      </p:grpSpPr>
+      <p:sp>
+        <p:nvSpPr>
+          <p:cNvPr id="2" name="Tittel 1">
+            <a:extLst>
+              <a:ext uri="{FF2B5EF4-FFF2-40B4-BE49-F238E27FC236}">
+                <a16:creationId xmlns:a16="http://schemas.microsoft.com/office/drawing/2014/main" id="{B458CAFE-9635-7F40-FECA-276B995EF427}"/>
+              </a:ext>
+            </a:extLst>
+          </p:cNvPr>
+          <p:cNvSpPr>
+            <a:spLocks noGrp="1"/>
+          </p:cNvSpPr>
+          <p:nvPr>
+            <p:ph type="title"/>
+          </p:nvPr>
+        </p:nvSpPr>
+        <p:spPr/>
+        <p:txBody>
+          <a:bodyPr/>
+          <a:lstStyle/>
+          <a:p>
+            <a:r>
+              <a:rPr lang="en-US" b="0" i="0" dirty="0">
+                <a:effectLst/>
+                <a:latin typeface="Arial" panose="020B0604020202020204" pitchFamily="34" charset="0"/>
+              </a:rPr>
+              <a:t>Lesson Learned</a:t>
+            </a:r>
+            <a:endParaRPr lang="en-US" dirty="0"/>
+          </a:p>
+        </p:txBody>
+      </p:sp>
+      <p:sp>
+        <p:nvSpPr>
+          <p:cNvPr id="3" name="Plassholder for innhold 2">
+            <a:extLst>
+              <a:ext uri="{FF2B5EF4-FFF2-40B4-BE49-F238E27FC236}">
+                <a16:creationId xmlns:a16="http://schemas.microsoft.com/office/drawing/2014/main" id="{AD95F636-E998-27EA-0985-128EA99AF884}"/>
+              </a:ext>
+            </a:extLst>
+          </p:cNvPr>
+          <p:cNvSpPr>
+            <a:spLocks noGrp="1"/>
+          </p:cNvSpPr>
+          <p:nvPr>
+            <p:ph idx="1"/>
+          </p:nvPr>
+        </p:nvSpPr>
+        <p:spPr/>
+        <p:txBody>
+          <a:bodyPr/>
+          <a:lstStyle/>
+          <a:p>
+            <a:endParaRPr lang="en-US" dirty="0"/>
+          </a:p>
+        </p:txBody>
+      </p:sp>
+    </p:spTree>
+    <p:extLst>
+      <p:ext uri="{BB962C8B-B14F-4D97-AF65-F5344CB8AC3E}">
+        <p14:creationId xmlns:p14="http://schemas.microsoft.com/office/powerpoint/2010/main" val="1308712160"/>
+      </p:ext>
+    </p:extLst>
+  </p:cSld>
+  <p:clrMapOvr>
+    <a:masterClrMapping/>
+  </p:clrMapOvr>
+</p:sld>
+</file>
+
+<file path=ppt/slides/slide7.xml><?xml version="1.0" encoding="utf-8"?>
+<p:sld xmlns:a="http://schemas.openxmlformats.org/drawingml/2006/main" xmlns:r="http://schemas.openxmlformats.org/officeDocument/2006/relationships" xmlns:p="http://schemas.openxmlformats.org/presentationml/2006/main">
+  <p:cSld>
+    <p:spTree>
+      <p:nvGrpSpPr>
+        <p:cNvPr id="1" name=""/>
+        <p:cNvGrpSpPr/>
+        <p:nvPr/>
+      </p:nvGrpSpPr>
+      <p:grpSpPr>
+        <a:xfrm>
+          <a:off x="0" y="0"/>
+          <a:ext cx="0" cy="0"/>
+          <a:chOff x="0" y="0"/>
+          <a:chExt cx="0" cy="0"/>
+        </a:xfrm>
+      </p:grpSpPr>
+      <p:sp>
+        <p:nvSpPr>
+          <p:cNvPr id="2" name="Tittel 1">
+            <a:extLst>
+              <a:ext uri="{FF2B5EF4-FFF2-40B4-BE49-F238E27FC236}">
+                <a16:creationId xmlns:a16="http://schemas.microsoft.com/office/drawing/2014/main" id="{7D150E39-4466-4DEF-6A23-81F0FE8764B2}"/>
+              </a:ext>
+            </a:extLst>
+          </p:cNvPr>
+          <p:cNvSpPr>
+            <a:spLocks noGrp="1"/>
+          </p:cNvSpPr>
+          <p:nvPr>
+            <p:ph type="title"/>
+          </p:nvPr>
+        </p:nvSpPr>
+        <p:spPr/>
+        <p:txBody>
+          <a:bodyPr/>
+          <a:lstStyle/>
+          <a:p>
+            <a:r>
+              <a:rPr lang="en-US" b="0" i="0" dirty="0">
+                <a:effectLst/>
+                <a:latin typeface="Arial" panose="020B0604020202020204" pitchFamily="34" charset="0"/>
+              </a:rPr>
+              <a:t>Project Timeline</a:t>
+            </a:r>
+            <a:endParaRPr lang="en-US" dirty="0"/>
+          </a:p>
+        </p:txBody>
+      </p:sp>
+      <p:sp>
+        <p:nvSpPr>
+          <p:cNvPr id="3" name="Plassholder for innhold 2">
+            <a:extLst>
+              <a:ext uri="{FF2B5EF4-FFF2-40B4-BE49-F238E27FC236}">
+                <a16:creationId xmlns:a16="http://schemas.microsoft.com/office/drawing/2014/main" id="{5A192EE3-29FB-78BF-A621-98FFAB8D9A41}"/>
+              </a:ext>
+            </a:extLst>
+          </p:cNvPr>
+          <p:cNvSpPr>
+            <a:spLocks noGrp="1"/>
+          </p:cNvSpPr>
+          <p:nvPr>
+            <p:ph idx="1"/>
+          </p:nvPr>
+        </p:nvSpPr>
+        <p:spPr/>
+        <p:txBody>
+          <a:bodyPr/>
+          <a:lstStyle/>
+          <a:p>
+            <a:endParaRPr lang="en-US"/>
+          </a:p>
+        </p:txBody>
+      </p:sp>
+    </p:spTree>
+    <p:extLst>
+      <p:ext uri="{BB962C8B-B14F-4D97-AF65-F5344CB8AC3E}">
+        <p14:creationId xmlns:p14="http://schemas.microsoft.com/office/powerpoint/2010/main" val="864597615"/>
+      </p:ext>
+    </p:extLst>
+  </p:cSld>
+  <p:clrMapOvr>
+    <a:masterClrMapping/>
+  </p:clrMapOvr>
+</p:sld>
+</file>
+
+<file path=ppt/slides/slide8.xml><?xml version="1.0" encoding="utf-8"?>
+<p:sld xmlns:a="http://schemas.openxmlformats.org/drawingml/2006/main" xmlns:r="http://schemas.openxmlformats.org/officeDocument/2006/relationships" xmlns:p="http://schemas.openxmlformats.org/presentationml/2006/main">
+  <p:cSld>
+    <p:spTree>
+      <p:nvGrpSpPr>
+        <p:cNvPr id="1" name=""/>
+        <p:cNvGrpSpPr/>
+        <p:nvPr/>
+      </p:nvGrpSpPr>
+      <p:grpSpPr>
+        <a:xfrm>
+          <a:off x="0" y="0"/>
+          <a:ext cx="0" cy="0"/>
+          <a:chOff x="0" y="0"/>
+          <a:chExt cx="0" cy="0"/>
+        </a:xfrm>
+      </p:grpSpPr>
+      <p:sp>
+        <p:nvSpPr>
+          <p:cNvPr id="2" name="Tittel 1">
+            <a:extLst>
+              <a:ext uri="{FF2B5EF4-FFF2-40B4-BE49-F238E27FC236}">
+                <a16:creationId xmlns:a16="http://schemas.microsoft.com/office/drawing/2014/main" id="{5BD666D3-125E-01CD-43AA-07CE4F3CF7D2}"/>
+              </a:ext>
+            </a:extLst>
+          </p:cNvPr>
+          <p:cNvSpPr>
+            <a:spLocks noGrp="1"/>
+          </p:cNvSpPr>
+          <p:nvPr>
+            <p:ph type="title"/>
+          </p:nvPr>
+        </p:nvSpPr>
+        <p:spPr/>
+        <p:txBody>
+          <a:bodyPr/>
+          <a:lstStyle/>
+          <a:p>
+            <a:r>
+              <a:rPr lang="en-US" b="0" i="0" dirty="0">
+                <a:effectLst/>
+                <a:latin typeface="Arial" panose="020B0604020202020204" pitchFamily="34" charset="0"/>
+              </a:rPr>
+              <a:t>Thank you</a:t>
+            </a:r>
+            <a:endParaRPr lang="en-US" dirty="0"/>
+          </a:p>
+        </p:txBody>
+      </p:sp>
+      <p:sp>
+        <p:nvSpPr>
+          <p:cNvPr id="3" name="Plassholder for innhold 2">
+            <a:extLst>
+              <a:ext uri="{FF2B5EF4-FFF2-40B4-BE49-F238E27FC236}">
+                <a16:creationId xmlns:a16="http://schemas.microsoft.com/office/drawing/2014/main" id="{AFFFBF47-1093-AA13-D0F9-EC5C1A9B9E50}"/>
+              </a:ext>
+            </a:extLst>
+          </p:cNvPr>
+          <p:cNvSpPr>
+            <a:spLocks noGrp="1"/>
+          </p:cNvSpPr>
+          <p:nvPr>
+            <p:ph idx="1"/>
+          </p:nvPr>
+        </p:nvSpPr>
+        <p:spPr/>
+        <p:txBody>
+          <a:bodyPr/>
+          <a:lstStyle/>
+          <a:p>
+            <a:endParaRPr lang="en-US"/>
+          </a:p>
+        </p:txBody>
+      </p:sp>
+    </p:spTree>
+    <p:extLst>
+      <p:ext uri="{BB962C8B-B14F-4D97-AF65-F5344CB8AC3E}">
+        <p14:creationId xmlns:p14="http://schemas.microsoft.com/office/powerpoint/2010/main" val="2916937393"/>
       </p:ext>
     </p:extLst>
   </p:cSld>

</xml_diff>

<commit_message>
Demo video website and lessons learned for sprint 1 presentation
</commit_message>
<xml_diff>
--- a/Documentation/Sprint 1 Pres.pptx
+++ b/Documentation/Sprint 1 Pres.pptx
@@ -11,9 +11,10 @@
     <p:sldId id="259" r:id="rId5"/>
     <p:sldId id="260" r:id="rId6"/>
     <p:sldId id="264" r:id="rId7"/>
-    <p:sldId id="261" r:id="rId8"/>
-    <p:sldId id="262" r:id="rId9"/>
-    <p:sldId id="263" r:id="rId10"/>
+    <p:sldId id="265" r:id="rId8"/>
+    <p:sldId id="261" r:id="rId9"/>
+    <p:sldId id="262" r:id="rId10"/>
+    <p:sldId id="263" r:id="rId11"/>
   </p:sldIdLst>
   <p:sldSz cx="12192000" cy="6858000"/>
   <p:notesSz cx="6858000" cy="9144000"/>
@@ -118,6 +119,16 @@
     </p:ext>
   </p:extLst>
 </p:presentation>
+</file>
+
+<file path=ppt/revisionInfo.xml><?xml version="1.0" encoding="utf-8"?>
+<p1510:revInfo xmlns:a="http://schemas.openxmlformats.org/drawingml/2006/main" xmlns:r="http://schemas.openxmlformats.org/officeDocument/2006/relationships" xmlns:p1510="http://schemas.microsoft.com/office/powerpoint/2015/10/main">
+  <p1510:revLst>
+    <p1510:client id="{515BB68C-A421-B453-5A2F-2DEF848B2A59}" v="670" dt="2022-10-12T22:05:12.561"/>
+    <p1510:client id="{D6AD504A-0B3A-5D82-EE7C-E5215C71085F}" v="118" dt="2022-10-12T18:33:57.874"/>
+    <p1510:client id="{F11CF8E4-3BC2-36B7-B682-BAB395A07E00}" v="271" dt="2022-10-12T19:18:09.882"/>
+  </p1510:revLst>
+</p1510:revInfo>
 </file>
 
 <file path=ppt/slideLayouts/slideLayout1.xml><?xml version="1.0" encoding="utf-8"?>
@@ -3439,6 +3450,98 @@
 </p:sld>
 </file>
 
+<file path=ppt/slides/slide10.xml><?xml version="1.0" encoding="utf-8"?>
+<p:sld xmlns:a="http://schemas.openxmlformats.org/drawingml/2006/main" xmlns:r="http://schemas.openxmlformats.org/officeDocument/2006/relationships" xmlns:p="http://schemas.openxmlformats.org/presentationml/2006/main">
+  <p:cSld>
+    <p:spTree>
+      <p:nvGrpSpPr>
+        <p:cNvPr id="1" name=""/>
+        <p:cNvGrpSpPr/>
+        <p:nvPr/>
+      </p:nvGrpSpPr>
+      <p:grpSpPr>
+        <a:xfrm>
+          <a:off x="0" y="0"/>
+          <a:ext cx="0" cy="0"/>
+          <a:chOff x="0" y="0"/>
+          <a:chExt cx="0" cy="0"/>
+        </a:xfrm>
+      </p:grpSpPr>
+      <p:sp>
+        <p:nvSpPr>
+          <p:cNvPr id="2" name="Tittel 1">
+            <a:extLst>
+              <a:ext uri="{FF2B5EF4-FFF2-40B4-BE49-F238E27FC236}">
+                <a16:creationId xmlns:a16="http://schemas.microsoft.com/office/drawing/2014/main" id="{5BD666D3-125E-01CD-43AA-07CE4F3CF7D2}"/>
+              </a:ext>
+            </a:extLst>
+          </p:cNvPr>
+          <p:cNvSpPr>
+            <a:spLocks noGrp="1"/>
+          </p:cNvSpPr>
+          <p:nvPr>
+            <p:ph type="title"/>
+          </p:nvPr>
+        </p:nvSpPr>
+        <p:spPr/>
+        <p:txBody>
+          <a:bodyPr/>
+          <a:lstStyle/>
+          <a:p>
+            <a:r>
+              <a:rPr lang="en-US" b="0" i="0" dirty="0">
+                <a:effectLst/>
+                <a:latin typeface="Arial" panose="020B0604020202020204" pitchFamily="34" charset="0"/>
+              </a:rPr>
+              <a:t>Thank you</a:t>
+            </a:r>
+            <a:endParaRPr lang="en-US" dirty="0"/>
+          </a:p>
+        </p:txBody>
+      </p:sp>
+      <p:sp>
+        <p:nvSpPr>
+          <p:cNvPr id="3" name="Plassholder for innhold 2">
+            <a:extLst>
+              <a:ext uri="{FF2B5EF4-FFF2-40B4-BE49-F238E27FC236}">
+                <a16:creationId xmlns:a16="http://schemas.microsoft.com/office/drawing/2014/main" id="{AFFFBF47-1093-AA13-D0F9-EC5C1A9B9E50}"/>
+              </a:ext>
+            </a:extLst>
+          </p:cNvPr>
+          <p:cNvSpPr>
+            <a:spLocks noGrp="1"/>
+          </p:cNvSpPr>
+          <p:nvPr>
+            <p:ph idx="1"/>
+          </p:nvPr>
+        </p:nvSpPr>
+        <p:spPr/>
+        <p:txBody>
+          <a:bodyPr vert="horz" lIns="91440" tIns="45720" rIns="91440" bIns="45720" rtlCol="0" anchor="t">
+            <a:normAutofit/>
+          </a:bodyPr>
+          <a:lstStyle/>
+          <a:p>
+            <a:r>
+              <a:rPr lang="en-US" dirty="0"/>
+              <a:t>Questions?</a:t>
+            </a:r>
+          </a:p>
+        </p:txBody>
+      </p:sp>
+    </p:spTree>
+    <p:extLst>
+      <p:ext uri="{BB962C8B-B14F-4D97-AF65-F5344CB8AC3E}">
+        <p14:creationId xmlns:p14="http://schemas.microsoft.com/office/powerpoint/2010/main" val="2916937393"/>
+      </p:ext>
+    </p:extLst>
+  </p:cSld>
+  <p:clrMapOvr>
+    <a:masterClrMapping/>
+  </p:clrMapOvr>
+</p:sld>
+</file>
+
 <file path=ppt/slides/slide2.xml><?xml version="1.0" encoding="utf-8"?>
 <p:sld xmlns:a="http://schemas.openxmlformats.org/drawingml/2006/main" xmlns:r="http://schemas.openxmlformats.org/officeDocument/2006/relationships" xmlns:p="http://schemas.openxmlformats.org/presentationml/2006/main">
   <p:cSld>
@@ -3506,7 +3609,9 @@
         </p:nvSpPr>
         <p:spPr/>
         <p:txBody>
-          <a:bodyPr/>
+          <a:bodyPr vert="horz" lIns="91440" tIns="45720" rIns="91440" bIns="45720" rtlCol="0" anchor="t">
+            <a:normAutofit/>
+          </a:bodyPr>
           <a:lstStyle/>
           <a:p>
             <a:r>
@@ -3515,21 +3620,67 @@
             </a:r>
           </a:p>
           <a:p>
+            <a:pPr lvl="1"/>
+            <a:r>
+              <a:rPr lang="en-US" dirty="0">
+                <a:cs typeface="Calibri"/>
+              </a:rPr>
+              <a:t>Display aircraft information using a more reliable information source</a:t>
+            </a:r>
+          </a:p>
+          <a:p>
+            <a:pPr lvl="1"/>
+            <a:r>
+              <a:rPr lang="en-US" dirty="0">
+                <a:cs typeface="Calibri"/>
+              </a:rPr>
+              <a:t>Create a Website with better usability and display than FlightRadar24</a:t>
+            </a:r>
             <a:endParaRPr lang="en-US" dirty="0"/>
           </a:p>
           <a:p>
+            <a:pPr lvl="1"/>
+            <a:r>
+              <a:rPr lang="en-US" dirty="0">
+                <a:cs typeface="Calibri"/>
+              </a:rPr>
+              <a:t>Use ASR to incorporate ATC and Pilot communications </a:t>
+            </a:r>
+          </a:p>
+          <a:p>
             <a:r>
               <a:rPr lang="en-US" dirty="0"/>
-              <a:t>Benefit</a:t>
-            </a:r>
-          </a:p>
-          <a:p>
-            <a:endParaRPr lang="en-US" dirty="0"/>
+              <a:t>Benefit:</a:t>
+            </a:r>
+            <a:endParaRPr lang="en-US" dirty="0">
+              <a:cs typeface="Calibri"/>
+            </a:endParaRPr>
+          </a:p>
+          <a:p>
+            <a:pPr lvl="1"/>
+            <a:r>
+              <a:rPr lang="en-US" dirty="0">
+                <a:cs typeface="Calibri"/>
+              </a:rPr>
+              <a:t>Creating a more reliable </a:t>
+            </a:r>
           </a:p>
           <a:p>
             <a:r>
               <a:rPr lang="en-US" dirty="0"/>
-              <a:t>Importance</a:t>
+              <a:t>Importance:</a:t>
+            </a:r>
+            <a:endParaRPr lang="en-US" dirty="0">
+              <a:cs typeface="Calibri"/>
+            </a:endParaRPr>
+          </a:p>
+          <a:p>
+            <a:pPr lvl="1"/>
+            <a:r>
+              <a:rPr lang="en-US" dirty="0">
+                <a:cs typeface="Calibri"/>
+              </a:rPr>
+              <a:t>Providing information to </a:t>
             </a:r>
           </a:p>
         </p:txBody>
@@ -3614,12 +3765,14 @@
         </p:nvSpPr>
         <p:spPr/>
         <p:txBody>
-          <a:bodyPr/>
+          <a:bodyPr vert="horz" lIns="91440" tIns="45720" rIns="91440" bIns="45720" rtlCol="0" anchor="t">
+            <a:normAutofit/>
+          </a:bodyPr>
           <a:lstStyle/>
           <a:p>
             <a:r>
               <a:rPr lang="en-US" dirty="0"/>
-              <a:t>Assumptions </a:t>
+              <a:t>Assumptions </a:t>
             </a:r>
           </a:p>
           <a:p>
@@ -3828,7 +3981,7 @@
           <a:lstStyle/>
           <a:p>
             <a:r>
-              <a:rPr lang="en-US" b="1" dirty="0"/>
+              <a:rPr lang="en-US" dirty="0"/>
               <a:t>Sub Systems Design</a:t>
             </a:r>
           </a:p>
@@ -3957,8 +4110,8 @@
           <a:lstStyle/>
           <a:p>
             <a:r>
-              <a:rPr lang="en-US" b="1" dirty="0"/>
-              <a:t>Demo Video</a:t>
+              <a:rPr lang="en-US" dirty="0"/>
+              <a:t>Demo Video Website</a:t>
             </a:r>
           </a:p>
         </p:txBody>
@@ -3981,10 +4134,22 @@
         </p:nvSpPr>
         <p:spPr/>
         <p:txBody>
-          <a:bodyPr/>
-          <a:lstStyle/>
-          <a:p>
-            <a:endParaRPr lang="en-US" dirty="0"/>
+          <a:bodyPr vert="horz" lIns="91440" tIns="45720" rIns="91440" bIns="45720" rtlCol="0" anchor="t">
+            <a:normAutofit/>
+          </a:bodyPr>
+          <a:lstStyle/>
+          <a:p>
+            <a:r>
+              <a:rPr lang="en-US" dirty="0">
+                <a:ea typeface="+mn-lt"/>
+                <a:cs typeface="+mn-lt"/>
+                <a:hlinkClick r:id="rId2"/>
+              </a:rPr>
+              <a:t>Untitled.mp4 (Press control and click)</a:t>
+            </a:r>
+            <a:endParaRPr lang="en-US" dirty="0">
+              <a:cs typeface="Calibri"/>
+            </a:endParaRPr>
           </a:p>
         </p:txBody>
       </p:sp>
@@ -4020,10 +4185,10 @@
       </p:grpSpPr>
       <p:sp>
         <p:nvSpPr>
-          <p:cNvPr id="2" name="Tittel 1">
-            <a:extLst>
-              <a:ext uri="{FF2B5EF4-FFF2-40B4-BE49-F238E27FC236}">
-                <a16:creationId xmlns:a16="http://schemas.microsoft.com/office/drawing/2014/main" id="{B458CAFE-9635-7F40-FECA-276B995EF427}"/>
+          <p:cNvPr id="2" name="Title 1">
+            <a:extLst>
+              <a:ext uri="{FF2B5EF4-FFF2-40B4-BE49-F238E27FC236}">
+                <a16:creationId xmlns:a16="http://schemas.microsoft.com/office/drawing/2014/main" id="{CFFEAF4D-1A45-3031-D8CD-8F6CDBA15D10}"/>
               </a:ext>
             </a:extLst>
           </p:cNvPr>
@@ -4040,22 +4205,20 @@
           <a:lstStyle/>
           <a:p>
             <a:r>
-              <a:rPr lang="en-US" b="0" i="0" dirty="0">
-                <a:effectLst/>
-                <a:latin typeface="Arial" panose="020B0604020202020204" pitchFamily="34" charset="0"/>
+              <a:rPr lang="en-US" dirty="0">
+                <a:cs typeface="Calibri Light"/>
               </a:rPr>
-              <a:t>Lesson Learned</a:t>
-            </a:r>
-            <a:endParaRPr lang="en-US" dirty="0"/>
-          </a:p>
-        </p:txBody>
-      </p:sp>
-      <p:sp>
-        <p:nvSpPr>
-          <p:cNvPr id="3" name="Plassholder for innhold 2">
-            <a:extLst>
-              <a:ext uri="{FF2B5EF4-FFF2-40B4-BE49-F238E27FC236}">
-                <a16:creationId xmlns:a16="http://schemas.microsoft.com/office/drawing/2014/main" id="{AD95F636-E998-27EA-0985-128EA99AF884}"/>
+              <a:t>Demo Video Model</a:t>
+            </a:r>
+          </a:p>
+        </p:txBody>
+      </p:sp>
+      <p:sp>
+        <p:nvSpPr>
+          <p:cNvPr id="3" name="Content Placeholder 2">
+            <a:extLst>
+              <a:ext uri="{FF2B5EF4-FFF2-40B4-BE49-F238E27FC236}">
+                <a16:creationId xmlns:a16="http://schemas.microsoft.com/office/drawing/2014/main" id="{ED3BAE7F-8224-BF5A-35A4-94D29E10DD07}"/>
               </a:ext>
             </a:extLst>
           </p:cNvPr>
@@ -4071,14 +4234,14 @@
           <a:bodyPr/>
           <a:lstStyle/>
           <a:p>
-            <a:endParaRPr lang="en-US" dirty="0"/>
+            <a:endParaRPr lang="en-US"/>
           </a:p>
         </p:txBody>
       </p:sp>
     </p:spTree>
     <p:extLst>
       <p:ext uri="{BB962C8B-B14F-4D97-AF65-F5344CB8AC3E}">
-        <p14:creationId xmlns:p14="http://schemas.microsoft.com/office/powerpoint/2010/main" val="1308712160"/>
+        <p14:creationId xmlns:p14="http://schemas.microsoft.com/office/powerpoint/2010/main" val="3994853734"/>
       </p:ext>
     </p:extLst>
   </p:cSld>
@@ -4110,7 +4273,7 @@
           <p:cNvPr id="2" name="Tittel 1">
             <a:extLst>
               <a:ext uri="{FF2B5EF4-FFF2-40B4-BE49-F238E27FC236}">
-                <a16:creationId xmlns:a16="http://schemas.microsoft.com/office/drawing/2014/main" id="{7D150E39-4466-4DEF-6A23-81F0FE8764B2}"/>
+                <a16:creationId xmlns:a16="http://schemas.microsoft.com/office/drawing/2014/main" id="{B458CAFE-9635-7F40-FECA-276B995EF427}"/>
               </a:ext>
             </a:extLst>
           </p:cNvPr>
@@ -4126,46 +4289,92 @@
           <a:bodyPr/>
           <a:lstStyle/>
           <a:p>
+            <a:r>
+              <a:rPr lang="en-US" dirty="0">
+                <a:latin typeface="Arial"/>
+                <a:cs typeface="Arial"/>
+              </a:rPr>
+              <a:t>Lessons</a:t>
+            </a:r>
             <a:r>
               <a:rPr lang="en-US" b="0" i="0" dirty="0">
                 <a:effectLst/>
-                <a:latin typeface="Arial" panose="020B0604020202020204" pitchFamily="34" charset="0"/>
+                <a:latin typeface="Arial"/>
+                <a:cs typeface="Arial"/>
               </a:rPr>
-              <a:t>Project Timeline</a:t>
+              <a:t> Learned</a:t>
+            </a:r>
+            <a:endParaRPr lang="en-US" dirty="0">
+              <a:latin typeface="Arial"/>
+              <a:cs typeface="Arial"/>
+            </a:endParaRPr>
+          </a:p>
+        </p:txBody>
+      </p:sp>
+      <p:sp>
+        <p:nvSpPr>
+          <p:cNvPr id="3" name="Plassholder for innhold 2">
+            <a:extLst>
+              <a:ext uri="{FF2B5EF4-FFF2-40B4-BE49-F238E27FC236}">
+                <a16:creationId xmlns:a16="http://schemas.microsoft.com/office/drawing/2014/main" id="{AD95F636-E998-27EA-0985-128EA99AF884}"/>
+              </a:ext>
+            </a:extLst>
+          </p:cNvPr>
+          <p:cNvSpPr>
+            <a:spLocks noGrp="1"/>
+          </p:cNvSpPr>
+          <p:nvPr>
+            <p:ph idx="1"/>
+          </p:nvPr>
+        </p:nvSpPr>
+        <p:spPr/>
+        <p:txBody>
+          <a:bodyPr vert="horz" lIns="91440" tIns="45720" rIns="91440" bIns="45720" rtlCol="0" anchor="t">
+            <a:normAutofit/>
+          </a:bodyPr>
+          <a:lstStyle/>
+          <a:p>
+            <a:pPr marL="0" indent="0">
+              <a:buNone/>
+            </a:pPr>
+            <a:r>
+              <a:rPr lang="en-US" dirty="0">
+                <a:cs typeface="Calibri"/>
+              </a:rPr>
+              <a:t>Heading into the next sprint we will...</a:t>
             </a:r>
             <a:endParaRPr lang="en-US" dirty="0"/>
           </a:p>
-        </p:txBody>
-      </p:sp>
-      <p:sp>
-        <p:nvSpPr>
-          <p:cNvPr id="3" name="Plassholder for innhold 2">
-            <a:extLst>
-              <a:ext uri="{FF2B5EF4-FFF2-40B4-BE49-F238E27FC236}">
-                <a16:creationId xmlns:a16="http://schemas.microsoft.com/office/drawing/2014/main" id="{5A192EE3-29FB-78BF-A621-98FFAB8D9A41}"/>
-              </a:ext>
-            </a:extLst>
-          </p:cNvPr>
-          <p:cNvSpPr>
-            <a:spLocks noGrp="1"/>
-          </p:cNvSpPr>
-          <p:nvPr>
-            <p:ph idx="1"/>
-          </p:nvPr>
-        </p:nvSpPr>
-        <p:spPr/>
-        <p:txBody>
-          <a:bodyPr/>
-          <a:lstStyle/>
-          <a:p>
-            <a:endParaRPr lang="en-US"/>
+          <a:p>
+            <a:r>
+              <a:rPr lang="en-US" dirty="0">
+                <a:cs typeface="Calibri"/>
+              </a:rPr>
+              <a:t>Share documents in standardized way to avoid "permission denied"</a:t>
+            </a:r>
+          </a:p>
+          <a:p>
+            <a:r>
+              <a:rPr lang="en-US" dirty="0">
+                <a:cs typeface="Calibri"/>
+              </a:rPr>
+              <a:t>Communicate accomplishments better</a:t>
+            </a:r>
+          </a:p>
+          <a:p>
+            <a:r>
+              <a:rPr lang="en-US" dirty="0">
+                <a:cs typeface="Calibri"/>
+              </a:rPr>
+              <a:t>Use Trello more to mark tasks as completed or document progress</a:t>
+            </a:r>
           </a:p>
         </p:txBody>
       </p:sp>
     </p:spTree>
     <p:extLst>
       <p:ext uri="{BB962C8B-B14F-4D97-AF65-F5344CB8AC3E}">
-        <p14:creationId xmlns:p14="http://schemas.microsoft.com/office/powerpoint/2010/main" val="864597615"/>
+        <p14:creationId xmlns:p14="http://schemas.microsoft.com/office/powerpoint/2010/main" val="1308712160"/>
       </p:ext>
     </p:extLst>
   </p:cSld>
@@ -4197,7 +4406,7 @@
           <p:cNvPr id="2" name="Tittel 1">
             <a:extLst>
               <a:ext uri="{FF2B5EF4-FFF2-40B4-BE49-F238E27FC236}">
-                <a16:creationId xmlns:a16="http://schemas.microsoft.com/office/drawing/2014/main" id="{5BD666D3-125E-01CD-43AA-07CE4F3CF7D2}"/>
+                <a16:creationId xmlns:a16="http://schemas.microsoft.com/office/drawing/2014/main" id="{7D150E39-4466-4DEF-6A23-81F0FE8764B2}"/>
               </a:ext>
             </a:extLst>
           </p:cNvPr>
@@ -4218,44 +4427,323 @@
                 <a:effectLst/>
                 <a:latin typeface="Arial" panose="020B0604020202020204" pitchFamily="34" charset="0"/>
               </a:rPr>
-              <a:t>Thank you</a:t>
+              <a:t>Project Timeline</a:t>
             </a:r>
             <a:endParaRPr lang="en-US" dirty="0"/>
           </a:p>
         </p:txBody>
       </p:sp>
-      <p:sp>
-        <p:nvSpPr>
-          <p:cNvPr id="3" name="Plassholder for innhold 2">
-            <a:extLst>
-              <a:ext uri="{FF2B5EF4-FFF2-40B4-BE49-F238E27FC236}">
-                <a16:creationId xmlns:a16="http://schemas.microsoft.com/office/drawing/2014/main" id="{AFFFBF47-1093-AA13-D0F9-EC5C1A9B9E50}"/>
-              </a:ext>
-            </a:extLst>
-          </p:cNvPr>
-          <p:cNvSpPr>
-            <a:spLocks noGrp="1"/>
-          </p:cNvSpPr>
+      <p:graphicFrame>
+        <p:nvGraphicFramePr>
+          <p:cNvPr id="5" name="Table 5">
+            <a:extLst>
+              <a:ext uri="{FF2B5EF4-FFF2-40B4-BE49-F238E27FC236}">
+                <a16:creationId xmlns:a16="http://schemas.microsoft.com/office/drawing/2014/main" id="{77ACC04E-B841-9E68-C29C-308A5C49A195}"/>
+              </a:ext>
+            </a:extLst>
+          </p:cNvPr>
+          <p:cNvGraphicFramePr>
+            <a:graphicFrameLocks noGrp="1"/>
+          </p:cNvGraphicFramePr>
           <p:nvPr>
             <p:ph idx="1"/>
-          </p:nvPr>
-        </p:nvSpPr>
-        <p:spPr/>
-        <p:txBody>
-          <a:bodyPr/>
-          <a:lstStyle/>
-          <a:p>
-            <a:r>
-              <a:rPr lang="en-US" dirty="0"/>
-              <a:t>Questions</a:t>
-            </a:r>
-          </a:p>
-        </p:txBody>
-      </p:sp>
+            <p:extLst>
+              <p:ext uri="{D42A27DB-BD31-4B8C-83A1-F6EECF244321}">
+                <p14:modId xmlns:p14="http://schemas.microsoft.com/office/powerpoint/2010/main" val="1702656496"/>
+              </p:ext>
+            </p:extLst>
+          </p:nvPr>
+        </p:nvGraphicFramePr>
+        <p:xfrm>
+          <a:off x="838200" y="1825625"/>
+          <a:ext cx="10515599" cy="3667759"/>
+        </p:xfrm>
+        <a:graphic>
+          <a:graphicData uri="http://schemas.openxmlformats.org/drawingml/2006/table">
+            <a:tbl>
+              <a:tblPr firstRow="1" bandRow="1">
+                <a:tableStyleId>{5C22544A-7EE6-4342-B048-85BDC9FD1C3A}</a:tableStyleId>
+              </a:tblPr>
+              <a:tblGrid>
+                <a:gridCol w="1214437">
+                  <a:extLst>
+                    <a:ext uri="{9D8B030D-6E8A-4147-A177-3AD203B41FA5}">
+                      <a16:colId xmlns:a16="http://schemas.microsoft.com/office/drawing/2014/main" val="1195272328"/>
+                    </a:ext>
+                  </a:extLst>
+                </a:gridCol>
+                <a:gridCol w="9301162">
+                  <a:extLst>
+                    <a:ext uri="{9D8B030D-6E8A-4147-A177-3AD203B41FA5}">
+                      <a16:colId xmlns:a16="http://schemas.microsoft.com/office/drawing/2014/main" val="3366790467"/>
+                    </a:ext>
+                  </a:extLst>
+                </a:gridCol>
+              </a:tblGrid>
+              <a:tr h="370840">
+                <a:tc>
+                  <a:txBody>
+                    <a:bodyPr/>
+                    <a:lstStyle/>
+                    <a:p>
+                      <a:r>
+                        <a:rPr lang="en-US" dirty="0"/>
+                        <a:t>Sprint</a:t>
+                      </a:r>
+                    </a:p>
+                  </a:txBody>
+                  <a:tcPr/>
+                </a:tc>
+                <a:tc>
+                  <a:txBody>
+                    <a:bodyPr/>
+                    <a:lstStyle/>
+                    <a:p>
+                      <a:r>
+                        <a:rPr lang="en-US" dirty="0"/>
+                        <a:t>Goals</a:t>
+                      </a:r>
+                    </a:p>
+                  </a:txBody>
+                  <a:tcPr/>
+                </a:tc>
+                <a:extLst>
+                  <a:ext uri="{0D108BD9-81ED-4DB2-BD59-A6C34878D82A}">
+                    <a16:rowId xmlns:a16="http://schemas.microsoft.com/office/drawing/2014/main" val="112050846"/>
+                  </a:ext>
+                </a:extLst>
+              </a:tr>
+              <a:tr h="370840">
+                <a:tc>
+                  <a:txBody>
+                    <a:bodyPr/>
+                    <a:lstStyle/>
+                    <a:p>
+                      <a:r>
+                        <a:rPr lang="en-US" dirty="0"/>
+                        <a:t>1</a:t>
+                      </a:r>
+                    </a:p>
+                  </a:txBody>
+                  <a:tcPr/>
+                </a:tc>
+                <a:tc>
+                  <a:txBody>
+                    <a:bodyPr/>
+                    <a:lstStyle/>
+                    <a:p>
+                      <a:pPr marL="285750" indent="-285750">
+                        <a:buFont typeface="Arial"/>
+                        <a:buChar char="•"/>
+                      </a:pPr>
+                      <a:r>
+                        <a:rPr lang="en-US" dirty="0"/>
+                        <a:t>Install and learn </a:t>
+                      </a:r>
+                      <a:r>
+                        <a:rPr lang="en-US" dirty="0" err="1"/>
+                        <a:t>NeMo</a:t>
+                      </a:r>
+                    </a:p>
+                    <a:p>
+                      <a:pPr marL="285750" lvl="0" indent="-285750">
+                        <a:buFont typeface="Arial"/>
+                        <a:buChar char="•"/>
+                      </a:pPr>
+                      <a:r>
+                        <a:rPr lang="en-US" dirty="0"/>
+                        <a:t>Figure out where and how to host website</a:t>
+                      </a:r>
+                    </a:p>
+                    <a:p>
+                      <a:pPr marL="285750" lvl="0" indent="-285750">
+                        <a:buFont typeface="Arial"/>
+                        <a:buChar char="•"/>
+                      </a:pPr>
+                      <a:r>
+                        <a:rPr lang="en-US" dirty="0"/>
+                        <a:t>Research </a:t>
+                      </a:r>
+                      <a:r>
+                        <a:rPr lang="en-US" dirty="0" err="1"/>
+                        <a:t>PyTorch</a:t>
+                      </a:r>
+                      <a:r>
+                        <a:rPr lang="en-US" dirty="0"/>
+                        <a:t>, Aeronautical Map APIs, interactive map APIs, </a:t>
+                      </a:r>
+                      <a:r>
+                        <a:rPr lang="en-US" dirty="0" err="1"/>
+                        <a:t>NeMo</a:t>
+                      </a:r>
+                      <a:endParaRPr lang="en-US" dirty="0"/>
+                    </a:p>
+                    <a:p>
+                      <a:pPr marL="285750" lvl="0" indent="-285750">
+                        <a:buFont typeface="Arial"/>
+                        <a:buChar char="•"/>
+                      </a:pPr>
+                      <a:r>
+                        <a:rPr lang="en-US" dirty="0"/>
+                        <a:t>Initial website setup</a:t>
+                      </a:r>
+                    </a:p>
+                  </a:txBody>
+                  <a:tcPr/>
+                </a:tc>
+                <a:extLst>
+                  <a:ext uri="{0D108BD9-81ED-4DB2-BD59-A6C34878D82A}">
+                    <a16:rowId xmlns:a16="http://schemas.microsoft.com/office/drawing/2014/main" val="3882928323"/>
+                  </a:ext>
+                </a:extLst>
+              </a:tr>
+              <a:tr h="370840">
+                <a:tc>
+                  <a:txBody>
+                    <a:bodyPr/>
+                    <a:lstStyle/>
+                    <a:p>
+                      <a:r>
+                        <a:rPr lang="en-US" dirty="0"/>
+                        <a:t>2</a:t>
+                      </a:r>
+                    </a:p>
+                  </a:txBody>
+                  <a:tcPr/>
+                </a:tc>
+                <a:tc>
+                  <a:txBody>
+                    <a:bodyPr/>
+                    <a:lstStyle/>
+                    <a:p>
+                      <a:pPr marL="285750" indent="-285750">
+                        <a:buFont typeface="Arial"/>
+                        <a:buChar char="•"/>
+                      </a:pPr>
+                      <a:r>
+                        <a:rPr lang="en-US" dirty="0"/>
+                        <a:t>Get PC set up for hosting and training</a:t>
+                      </a:r>
+                    </a:p>
+                    <a:p>
+                      <a:pPr marL="285750" lvl="0" indent="-285750">
+                        <a:buFont typeface="Arial"/>
+                        <a:buChar char="•"/>
+                      </a:pPr>
+                      <a:r>
+                        <a:rPr lang="en-US" dirty="0"/>
+                        <a:t>Website map improvements</a:t>
+                      </a:r>
+                    </a:p>
+                    <a:p>
+                      <a:pPr marL="285750" lvl="0" indent="-285750">
+                        <a:buFont typeface="Arial"/>
+                        <a:buChar char="•"/>
+                      </a:pPr>
+                      <a:r>
+                        <a:rPr lang="en-US" dirty="0"/>
+                        <a:t>Add floating textbox to website</a:t>
+                      </a:r>
+                    </a:p>
+                    <a:p>
+                      <a:pPr marL="285750" lvl="0" indent="-285750">
+                        <a:buFont typeface="Arial"/>
+                        <a:buChar char="•"/>
+                      </a:pPr>
+                      <a:r>
+                        <a:rPr lang="en-US" sz="1800" b="0" i="0" u="none" strike="noStrike" noProof="0" dirty="0">
+                          <a:latin typeface="Calibri"/>
+                        </a:rPr>
+                        <a:t>Use example datasets to train Nemo Model</a:t>
+                      </a:r>
+                    </a:p>
+                    <a:p>
+                      <a:pPr marL="285750" lvl="0" indent="-285750">
+                        <a:buFont typeface="Arial"/>
+                        <a:buChar char="•"/>
+                      </a:pPr>
+                      <a:r>
+                        <a:rPr lang="en-US" sz="1800" b="0" i="0" u="none" strike="noStrike" noProof="0" dirty="0">
+                          <a:latin typeface="Calibri"/>
+                        </a:rPr>
+                        <a:t>Research </a:t>
+                      </a:r>
+                      <a:r>
+                        <a:rPr lang="en-US" sz="1800" b="0" i="0" u="none" strike="noStrike" noProof="0" dirty="0"/>
+                        <a:t>ASR API, </a:t>
+                      </a:r>
+                    </a:p>
+                    <a:p>
+                      <a:pPr marL="285750" lvl="0" indent="-285750">
+                        <a:buFont typeface="Arial"/>
+                        <a:buChar char="•"/>
+                      </a:pPr>
+                      <a:r>
+                        <a:rPr lang="en-US" sz="1800" b="0" i="0" u="none" strike="noStrike" noProof="0" dirty="0"/>
+                        <a:t>Do Summative Statistics on 4 Models and o</a:t>
+                      </a:r>
+                      <a:r>
+                        <a:rPr lang="en-US" sz="1800" b="0" i="0" u="none" strike="noStrike" noProof="0" dirty="0">
+                          <a:latin typeface="Calibri"/>
+                        </a:rPr>
+                        <a:t>ptimize</a:t>
+                      </a:r>
+                    </a:p>
+                  </a:txBody>
+                  <a:tcPr/>
+                </a:tc>
+                <a:extLst>
+                  <a:ext uri="{0D108BD9-81ED-4DB2-BD59-A6C34878D82A}">
+                    <a16:rowId xmlns:a16="http://schemas.microsoft.com/office/drawing/2014/main" val="1395428933"/>
+                  </a:ext>
+                </a:extLst>
+              </a:tr>
+              <a:tr h="370839">
+                <a:tc>
+                  <a:txBody>
+                    <a:bodyPr/>
+                    <a:lstStyle/>
+                    <a:p>
+                      <a:pPr lvl="0">
+                        <a:buNone/>
+                      </a:pPr>
+                      <a:r>
+                        <a:rPr lang="en-US" dirty="0"/>
+                        <a:t>Backlog</a:t>
+                      </a:r>
+                    </a:p>
+                  </a:txBody>
+                  <a:tcPr/>
+                </a:tc>
+                <a:tc>
+                  <a:txBody>
+                    <a:bodyPr/>
+                    <a:lstStyle/>
+                    <a:p>
+                      <a:pPr marL="0" lvl="0" indent="0">
+                        <a:buNone/>
+                      </a:pPr>
+                      <a:endParaRPr lang="en-US" sz="1800" b="0" i="0" u="none" strike="noStrike" noProof="0" dirty="0">
+                        <a:latin typeface="Calibri"/>
+                      </a:endParaRPr>
+                    </a:p>
+                  </a:txBody>
+                  <a:tcPr/>
+                </a:tc>
+                <a:extLst>
+                  <a:ext uri="{0D108BD9-81ED-4DB2-BD59-A6C34878D82A}">
+                    <a16:rowId xmlns:a16="http://schemas.microsoft.com/office/drawing/2014/main" val="1653873898"/>
+                  </a:ext>
+                </a:extLst>
+              </a:tr>
+            </a:tbl>
+          </a:graphicData>
+        </a:graphic>
+      </p:graphicFrame>
     </p:spTree>
     <p:extLst>
       <p:ext uri="{BB962C8B-B14F-4D97-AF65-F5344CB8AC3E}">
-        <p14:creationId xmlns:p14="http://schemas.microsoft.com/office/powerpoint/2010/main" val="2916937393"/>
+        <p14:creationId xmlns:p14="http://schemas.microsoft.com/office/powerpoint/2010/main" val="864597615"/>
       </p:ext>
     </p:extLst>
   </p:cSld>

</xml_diff>